<commit_message>
Updated telem with read_write flag access
</commit_message>
<xml_diff>
--- a/docs/Arch.pptx
+++ b/docs/Arch.pptx
@@ -496,7 +496,7 @@
           <a:p>
             <a:fld id="{B3E19B58-7A25-42CD-994B-C82EEADC5E6C}" type="datetimeFigureOut">
               <a:rPr lang="en-US" smtClean="0"/>
-              <a:t>5/14/2022</a:t>
+              <a:t>5/15/2022</a:t>
             </a:fld>
             <a:endParaRPr lang="en-US"/>
           </a:p>
@@ -694,7 +694,7 @@
           <a:p>
             <a:fld id="{B3E19B58-7A25-42CD-994B-C82EEADC5E6C}" type="datetimeFigureOut">
               <a:rPr lang="en-US" smtClean="0"/>
-              <a:t>5/14/2022</a:t>
+              <a:t>5/15/2022</a:t>
             </a:fld>
             <a:endParaRPr lang="en-US"/>
           </a:p>
@@ -902,7 +902,7 @@
           <a:p>
             <a:fld id="{B3E19B58-7A25-42CD-994B-C82EEADC5E6C}" type="datetimeFigureOut">
               <a:rPr lang="en-US" smtClean="0"/>
-              <a:t>5/14/2022</a:t>
+              <a:t>5/15/2022</a:t>
             </a:fld>
             <a:endParaRPr lang="en-US"/>
           </a:p>
@@ -1100,7 +1100,7 @@
           <a:p>
             <a:fld id="{B3E19B58-7A25-42CD-994B-C82EEADC5E6C}" type="datetimeFigureOut">
               <a:rPr lang="en-US" smtClean="0"/>
-              <a:t>5/14/2022</a:t>
+              <a:t>5/15/2022</a:t>
             </a:fld>
             <a:endParaRPr lang="en-US"/>
           </a:p>
@@ -1375,7 +1375,7 @@
           <a:p>
             <a:fld id="{B3E19B58-7A25-42CD-994B-C82EEADC5E6C}" type="datetimeFigureOut">
               <a:rPr lang="en-US" smtClean="0"/>
-              <a:t>5/14/2022</a:t>
+              <a:t>5/15/2022</a:t>
             </a:fld>
             <a:endParaRPr lang="en-US"/>
           </a:p>
@@ -1640,7 +1640,7 @@
           <a:p>
             <a:fld id="{B3E19B58-7A25-42CD-994B-C82EEADC5E6C}" type="datetimeFigureOut">
               <a:rPr lang="en-US" smtClean="0"/>
-              <a:t>5/14/2022</a:t>
+              <a:t>5/15/2022</a:t>
             </a:fld>
             <a:endParaRPr lang="en-US"/>
           </a:p>
@@ -2052,7 +2052,7 @@
           <a:p>
             <a:fld id="{B3E19B58-7A25-42CD-994B-C82EEADC5E6C}" type="datetimeFigureOut">
               <a:rPr lang="en-US" smtClean="0"/>
-              <a:t>5/14/2022</a:t>
+              <a:t>5/15/2022</a:t>
             </a:fld>
             <a:endParaRPr lang="en-US"/>
           </a:p>
@@ -2193,7 +2193,7 @@
           <a:p>
             <a:fld id="{B3E19B58-7A25-42CD-994B-C82EEADC5E6C}" type="datetimeFigureOut">
               <a:rPr lang="en-US" smtClean="0"/>
-              <a:t>5/14/2022</a:t>
+              <a:t>5/15/2022</a:t>
             </a:fld>
             <a:endParaRPr lang="en-US"/>
           </a:p>
@@ -2306,7 +2306,7 @@
           <a:p>
             <a:fld id="{B3E19B58-7A25-42CD-994B-C82EEADC5E6C}" type="datetimeFigureOut">
               <a:rPr lang="en-US" smtClean="0"/>
-              <a:t>5/14/2022</a:t>
+              <a:t>5/15/2022</a:t>
             </a:fld>
             <a:endParaRPr lang="en-US"/>
           </a:p>
@@ -2617,7 +2617,7 @@
           <a:p>
             <a:fld id="{B3E19B58-7A25-42CD-994B-C82EEADC5E6C}" type="datetimeFigureOut">
               <a:rPr lang="en-US" smtClean="0"/>
-              <a:t>5/14/2022</a:t>
+              <a:t>5/15/2022</a:t>
             </a:fld>
             <a:endParaRPr lang="en-US"/>
           </a:p>
@@ -2905,7 +2905,7 @@
           <a:p>
             <a:fld id="{B3E19B58-7A25-42CD-994B-C82EEADC5E6C}" type="datetimeFigureOut">
               <a:rPr lang="en-US" smtClean="0"/>
-              <a:t>5/14/2022</a:t>
+              <a:t>5/15/2022</a:t>
             </a:fld>
             <a:endParaRPr lang="en-US"/>
           </a:p>
@@ -3146,7 +3146,7 @@
           <a:p>
             <a:fld id="{B3E19B58-7A25-42CD-994B-C82EEADC5E6C}" type="datetimeFigureOut">
               <a:rPr lang="en-US" smtClean="0"/>
-              <a:t>5/14/2022</a:t>
+              <a:t>5/15/2022</a:t>
             </a:fld>
             <a:endParaRPr lang="en-US"/>
           </a:p>
@@ -4409,7 +4409,7 @@
                   <a:schemeClr val="tx1"/>
                 </a:solidFill>
               </a:rPr>
-              <a:t>IMU</a:t>
+              <a:t>MPU</a:t>
             </a:r>
           </a:p>
         </p:txBody>

</xml_diff>